<commit_message>
fixed pcfdev install directions
</commit_message>
<xml_diff>
--- a/Presentations/Lab01_Topics.pptx
+++ b/Presentations/Lab01_Topics.pptx
@@ -15322,7 +15322,41 @@
             </a:pPr>
             <a:r>
               <a:rPr lang="en-US" dirty="0" smtClean="0"/>
-              <a:t>Install Vagrant</a:t>
+              <a:t>Download </a:t>
+            </a:r>
+            <a:r>
+              <a:rPr lang="en-US" dirty="0" err="1" smtClean="0"/>
+              <a:t>pcfdev</a:t>
+            </a:r>
+            <a:r>
+              <a:rPr lang="en-US" dirty="0" smtClean="0"/>
+              <a:t> from https</a:t>
+            </a:r>
+            <a:r>
+              <a:rPr lang="en-US" dirty="0"/>
+              <a:t>://</a:t>
+            </a:r>
+            <a:r>
+              <a:rPr lang="en-US" dirty="0" err="1"/>
+              <a:t>network.pivotal.io</a:t>
+            </a:r>
+            <a:r>
+              <a:rPr lang="en-US" dirty="0"/>
+              <a:t>/</a:t>
+            </a:r>
+          </a:p>
+          <a:p>
+            <a:pPr marL="514350" indent="-514350">
+              <a:buFont typeface="+mj-lt"/>
+              <a:buAutoNum type="arabicPeriod"/>
+            </a:pPr>
+            <a:r>
+              <a:rPr lang="en-US" dirty="0" smtClean="0"/>
+              <a:t>Install </a:t>
+            </a:r>
+            <a:r>
+              <a:rPr lang="en-US" dirty="0" smtClean="0"/>
+              <a:t>Vagrant</a:t>
             </a:r>
             <a:endParaRPr lang="es-ES_tradnl" dirty="0"/>
           </a:p>

</xml_diff>